<commit_message>
Maksim - Meilenstein III Präsi update
</commit_message>
<xml_diff>
--- a/02_Milensteine/Meilenstein III/Gruppe3_MeilensteinIII_Prototyp.pptx
+++ b/02_Milensteine/Meilenstein III/Gruppe3_MeilensteinIII_Prototyp.pptx
@@ -5388,359 +5388,1168 @@
           </a:p>
         </p:txBody>
       </p:sp>
-      <p:sp>
-        <p:nvSpPr>
-          <p:cNvPr id="9" name="Inhaltsplatzhalter 8">
+      <p:grpSp>
+        <p:nvGrpSpPr>
+          <p:cNvPr id="75" name="Gruppieren 74">
             <a:extLst>
               <a:ext uri="{FF2B5EF4-FFF2-40B4-BE49-F238E27FC236}">
-                <a16:creationId xmlns:a16="http://schemas.microsoft.com/office/drawing/2014/main" id="{B3C16339-B6AE-4F08-B233-DC6D55AC9E11}"/>
+                <a16:creationId xmlns:a16="http://schemas.microsoft.com/office/drawing/2014/main" id="{55394950-AE1D-489F-2BCD-5F07525F3AA0}"/>
               </a:ext>
             </a:extLst>
           </p:cNvPr>
-          <p:cNvSpPr>
-            <a:spLocks noGrp="1"/>
-          </p:cNvSpPr>
-          <p:nvPr>
-            <p:ph idx="1"/>
-          </p:nvPr>
-        </p:nvSpPr>
-        <p:spPr>
+          <p:cNvGrpSpPr/>
+          <p:nvPr/>
+        </p:nvGrpSpPr>
+        <p:grpSpPr>
           <a:xfrm>
-            <a:off x="1371600" y="1642369"/>
-            <a:ext cx="9601200" cy="4705165"/>
+            <a:off x="2062424" y="1272815"/>
+            <a:ext cx="4916210" cy="5180571"/>
+            <a:chOff x="990709" y="1272815"/>
+            <a:chExt cx="4916210" cy="5180571"/>
           </a:xfrm>
-        </p:spPr>
-        <p:txBody>
-          <a:bodyPr/>
-          <a:lstStyle/>
-          <a:p>
-            <a:pPr marL="0" indent="0">
-              <a:buNone/>
-            </a:pPr>
-            <a:r>
-              <a:rPr lang="de-DE" dirty="0"/>
-              <a:t>D</a:t>
-            </a:r>
-          </a:p>
-          <a:p>
-            <a:pPr marL="0" indent="0">
-              <a:buNone/>
-            </a:pPr>
-            <a:r>
-              <a:rPr lang="de-DE" dirty="0"/>
-              <a:t>Login</a:t>
-            </a:r>
-          </a:p>
-          <a:p>
-            <a:pPr marL="0" indent="0">
-              <a:buNone/>
-            </a:pPr>
-            <a:r>
-              <a:rPr lang="de-DE" dirty="0"/>
-              <a:t>      </a:t>
-            </a:r>
-            <a:r>
-              <a:rPr lang="de-DE" dirty="0" err="1"/>
-              <a:t>static</a:t>
-            </a:r>
-            <a:endParaRPr lang="de-DE" dirty="0"/>
-          </a:p>
-          <a:p>
-            <a:pPr marL="0" indent="0">
-              <a:buNone/>
-            </a:pPr>
-            <a:r>
-              <a:rPr lang="de-DE" dirty="0"/>
-              <a:t>             	image.png</a:t>
-            </a:r>
-          </a:p>
-          <a:p>
-            <a:pPr marL="0" indent="0">
-              <a:buNone/>
-            </a:pPr>
-            <a:r>
-              <a:rPr lang="de-DE" dirty="0"/>
-              <a:t>	styles.css</a:t>
-            </a:r>
-          </a:p>
-          <a:p>
-            <a:pPr marL="0" indent="0">
-              <a:buNone/>
-            </a:pPr>
-            <a:r>
-              <a:rPr lang="de-DE" dirty="0"/>
-              <a:t>      </a:t>
-            </a:r>
-            <a:r>
-              <a:rPr lang="de-DE" dirty="0" err="1"/>
-              <a:t>templats</a:t>
-            </a:r>
-            <a:endParaRPr lang="de-DE" dirty="0"/>
-          </a:p>
-          <a:p>
-            <a:pPr marL="0" indent="0">
-              <a:buNone/>
-            </a:pPr>
-            <a:r>
-              <a:rPr lang="de-DE" dirty="0"/>
-              <a:t>	login.html</a:t>
-            </a:r>
-          </a:p>
-          <a:p>
-            <a:pPr marL="0" indent="0">
-              <a:buNone/>
-            </a:pPr>
-            <a:r>
-              <a:rPr lang="de-DE" dirty="0" err="1"/>
-              <a:t>Reset</a:t>
-            </a:r>
-            <a:r>
-              <a:rPr lang="de-DE" dirty="0"/>
-              <a:t> </a:t>
-            </a:r>
-            <a:r>
-              <a:rPr lang="de-DE" dirty="0" err="1"/>
-              <a:t>pw</a:t>
-            </a:r>
-            <a:endParaRPr lang="de-DE" dirty="0"/>
-          </a:p>
-          <a:p>
-            <a:pPr marL="0" indent="0">
-              <a:buNone/>
-            </a:pPr>
-            <a:r>
-              <a:rPr lang="de-DE" dirty="0"/>
-              <a:t>Registration</a:t>
-            </a:r>
-          </a:p>
-          <a:p>
-            <a:pPr marL="0" indent="0">
-              <a:buNone/>
-            </a:pPr>
-            <a:r>
-              <a:rPr lang="de-DE" dirty="0" err="1"/>
-              <a:t>gesamtübersicht</a:t>
-            </a:r>
-            <a:endParaRPr lang="de-DE" dirty="0"/>
-          </a:p>
-        </p:txBody>
-      </p:sp>
-      <p:pic>
-        <p:nvPicPr>
-          <p:cNvPr id="10" name="Inhaltsplatzhalter 6">
-            <a:extLst>
-              <a:ext uri="{FF2B5EF4-FFF2-40B4-BE49-F238E27FC236}">
-                <a16:creationId xmlns:a16="http://schemas.microsoft.com/office/drawing/2014/main" id="{6C7C0DB7-F9FF-A7A5-1E23-983F1236C45F}"/>
-              </a:ext>
-            </a:extLst>
-          </p:cNvPr>
-          <p:cNvPicPr>
-            <a:picLocks noChangeAspect="1"/>
-          </p:cNvPicPr>
-          <p:nvPr/>
-        </p:nvPicPr>
-        <p:blipFill>
-          <a:blip r:embed="rId2">
-            <a:extLst>
-              <a:ext uri="{28A0092B-C50C-407E-A947-70E740481C1C}">
-                <a14:useLocalDpi xmlns:a14="http://schemas.microsoft.com/office/drawing/2010/main" val="0"/>
-              </a:ext>
-            </a:extLst>
-          </a:blip>
-          <a:stretch>
-            <a:fillRect/>
-          </a:stretch>
-        </p:blipFill>
-        <p:spPr>
-          <a:xfrm>
-            <a:off x="966985" y="1982946"/>
-            <a:ext cx="404615" cy="404615"/>
-          </a:xfrm>
-          <a:prstGeom prst="rect">
-            <a:avLst/>
-          </a:prstGeom>
-        </p:spPr>
-      </p:pic>
-      <p:pic>
-        <p:nvPicPr>
-          <p:cNvPr id="11" name="Inhaltsplatzhalter 6">
-            <a:extLst>
-              <a:ext uri="{FF2B5EF4-FFF2-40B4-BE49-F238E27FC236}">
-                <a16:creationId xmlns:a16="http://schemas.microsoft.com/office/drawing/2014/main" id="{5474AE0B-D451-2C25-9EAC-033057DA7B29}"/>
-              </a:ext>
-            </a:extLst>
-          </p:cNvPr>
-          <p:cNvPicPr>
-            <a:picLocks noChangeAspect="1"/>
-          </p:cNvPicPr>
-          <p:nvPr/>
-        </p:nvPicPr>
-        <p:blipFill>
-          <a:blip r:embed="rId2">
-            <a:extLst>
-              <a:ext uri="{28A0092B-C50C-407E-A947-70E740481C1C}">
-                <a14:useLocalDpi xmlns:a14="http://schemas.microsoft.com/office/drawing/2010/main" val="0"/>
-              </a:ext>
-            </a:extLst>
-          </a:blip>
-          <a:stretch>
-            <a:fillRect/>
-          </a:stretch>
-        </p:blipFill>
-        <p:spPr>
-          <a:xfrm>
-            <a:off x="1371600" y="2387561"/>
-            <a:ext cx="404615" cy="404615"/>
-          </a:xfrm>
-          <a:prstGeom prst="rect">
-            <a:avLst/>
-          </a:prstGeom>
-        </p:spPr>
-      </p:pic>
-      <p:pic>
-        <p:nvPicPr>
-          <p:cNvPr id="12" name="Inhaltsplatzhalter 6">
-            <a:extLst>
-              <a:ext uri="{FF2B5EF4-FFF2-40B4-BE49-F238E27FC236}">
-                <a16:creationId xmlns:a16="http://schemas.microsoft.com/office/drawing/2014/main" id="{9EF4B8E7-B8E6-5EE3-686C-EE16210CFF0E}"/>
-              </a:ext>
-            </a:extLst>
-          </p:cNvPr>
-          <p:cNvPicPr>
-            <a:picLocks noChangeAspect="1"/>
-          </p:cNvPicPr>
-          <p:nvPr/>
-        </p:nvPicPr>
-        <p:blipFill>
-          <a:blip r:embed="rId2">
-            <a:extLst>
-              <a:ext uri="{28A0092B-C50C-407E-A947-70E740481C1C}">
-                <a14:useLocalDpi xmlns:a14="http://schemas.microsoft.com/office/drawing/2010/main" val="0"/>
-              </a:ext>
-            </a:extLst>
-          </a:blip>
-          <a:stretch>
-            <a:fillRect/>
-          </a:stretch>
-        </p:blipFill>
-        <p:spPr>
-          <a:xfrm>
-            <a:off x="1371600" y="3813551"/>
-            <a:ext cx="404615" cy="404615"/>
-          </a:xfrm>
-          <a:prstGeom prst="rect">
-            <a:avLst/>
-          </a:prstGeom>
-        </p:spPr>
-      </p:pic>
-      <p:pic>
-        <p:nvPicPr>
-          <p:cNvPr id="13" name="Inhaltsplatzhalter 6">
-            <a:extLst>
-              <a:ext uri="{FF2B5EF4-FFF2-40B4-BE49-F238E27FC236}">
-                <a16:creationId xmlns:a16="http://schemas.microsoft.com/office/drawing/2014/main" id="{570E6EFF-2036-47F0-D5B1-84507BCA2F94}"/>
-              </a:ext>
-            </a:extLst>
-          </p:cNvPr>
-          <p:cNvPicPr>
-            <a:picLocks noChangeAspect="1"/>
-          </p:cNvPicPr>
-          <p:nvPr/>
-        </p:nvPicPr>
-        <p:blipFill>
-          <a:blip r:embed="rId2">
-            <a:extLst>
-              <a:ext uri="{28A0092B-C50C-407E-A947-70E740481C1C}">
-                <a14:useLocalDpi xmlns:a14="http://schemas.microsoft.com/office/drawing/2010/main" val="0"/>
-              </a:ext>
-            </a:extLst>
-          </a:blip>
-          <a:stretch>
-            <a:fillRect/>
-          </a:stretch>
-        </p:blipFill>
-        <p:spPr>
-          <a:xfrm>
-            <a:off x="966985" y="4675927"/>
-            <a:ext cx="404615" cy="404615"/>
-          </a:xfrm>
-          <a:prstGeom prst="rect">
-            <a:avLst/>
-          </a:prstGeom>
-        </p:spPr>
-      </p:pic>
-      <p:pic>
-        <p:nvPicPr>
-          <p:cNvPr id="14" name="Inhaltsplatzhalter 6">
-            <a:extLst>
-              <a:ext uri="{FF2B5EF4-FFF2-40B4-BE49-F238E27FC236}">
-                <a16:creationId xmlns:a16="http://schemas.microsoft.com/office/drawing/2014/main" id="{3CC96C91-A284-F3A4-23E4-08FE3B6869A7}"/>
-              </a:ext>
-            </a:extLst>
-          </p:cNvPr>
-          <p:cNvPicPr>
-            <a:picLocks noChangeAspect="1"/>
-          </p:cNvPicPr>
-          <p:nvPr/>
-        </p:nvPicPr>
-        <p:blipFill>
-          <a:blip r:embed="rId2">
-            <a:extLst>
-              <a:ext uri="{28A0092B-C50C-407E-A947-70E740481C1C}">
-                <a14:useLocalDpi xmlns:a14="http://schemas.microsoft.com/office/drawing/2010/main" val="0"/>
-              </a:ext>
-            </a:extLst>
-          </a:blip>
-          <a:stretch>
-            <a:fillRect/>
-          </a:stretch>
-        </p:blipFill>
-        <p:spPr>
-          <a:xfrm>
-            <a:off x="966984" y="5186394"/>
-            <a:ext cx="404615" cy="404615"/>
-          </a:xfrm>
-          <a:prstGeom prst="rect">
-            <a:avLst/>
-          </a:prstGeom>
-        </p:spPr>
-      </p:pic>
-      <p:pic>
-        <p:nvPicPr>
-          <p:cNvPr id="15" name="Inhaltsplatzhalter 6">
-            <a:extLst>
-              <a:ext uri="{FF2B5EF4-FFF2-40B4-BE49-F238E27FC236}">
-                <a16:creationId xmlns:a16="http://schemas.microsoft.com/office/drawing/2014/main" id="{8823F495-7ABA-189B-E9CA-ADF6FC1E08B9}"/>
-              </a:ext>
-            </a:extLst>
-          </p:cNvPr>
-          <p:cNvPicPr>
-            <a:picLocks noChangeAspect="1"/>
-          </p:cNvPicPr>
-          <p:nvPr/>
-        </p:nvPicPr>
-        <p:blipFill>
-          <a:blip r:embed="rId2">
-            <a:extLst>
-              <a:ext uri="{28A0092B-C50C-407E-A947-70E740481C1C}">
-                <a14:useLocalDpi xmlns:a14="http://schemas.microsoft.com/office/drawing/2010/main" val="0"/>
-              </a:ext>
-            </a:extLst>
-          </a:blip>
-          <a:stretch>
-            <a:fillRect/>
-          </a:stretch>
-        </p:blipFill>
-        <p:spPr>
-          <a:xfrm>
-            <a:off x="966983" y="5668305"/>
-            <a:ext cx="404615" cy="404615"/>
-          </a:xfrm>
-          <a:prstGeom prst="rect">
-            <a:avLst/>
-          </a:prstGeom>
-        </p:spPr>
-      </p:pic>
+        </p:grpSpPr>
+        <p:grpSp>
+          <p:nvGrpSpPr>
+            <p:cNvPr id="65" name="Gruppieren 64">
+              <a:extLst>
+                <a:ext uri="{FF2B5EF4-FFF2-40B4-BE49-F238E27FC236}">
+                  <a16:creationId xmlns:a16="http://schemas.microsoft.com/office/drawing/2014/main" id="{57704BC6-2C77-62CE-D1E1-E8EC67B51075}"/>
+                </a:ext>
+              </a:extLst>
+            </p:cNvPr>
+            <p:cNvGrpSpPr/>
+            <p:nvPr/>
+          </p:nvGrpSpPr>
+          <p:grpSpPr>
+            <a:xfrm>
+              <a:off x="990709" y="1272815"/>
+              <a:ext cx="2275227" cy="5180571"/>
+              <a:chOff x="990709" y="1272815"/>
+              <a:chExt cx="2275227" cy="5180571"/>
+            </a:xfrm>
+          </p:grpSpPr>
+          <p:grpSp>
+            <p:nvGrpSpPr>
+              <p:cNvPr id="19" name="Gruppieren 18">
+                <a:extLst>
+                  <a:ext uri="{FF2B5EF4-FFF2-40B4-BE49-F238E27FC236}">
+                    <a16:creationId xmlns:a16="http://schemas.microsoft.com/office/drawing/2014/main" id="{FF65ED7C-B79E-410C-9690-542EEF58C96E}"/>
+                  </a:ext>
+                </a:extLst>
+              </p:cNvPr>
+              <p:cNvGrpSpPr/>
+              <p:nvPr/>
+            </p:nvGrpSpPr>
+            <p:grpSpPr>
+              <a:xfrm>
+                <a:off x="1719748" y="1807076"/>
+                <a:ext cx="1546188" cy="4646310"/>
+                <a:chOff x="924935" y="1728359"/>
+                <a:chExt cx="1546188" cy="4646310"/>
+              </a:xfrm>
+            </p:grpSpPr>
+            <p:pic>
+              <p:nvPicPr>
+                <p:cNvPr id="10" name="Inhaltsplatzhalter 6">
+                  <a:extLst>
+                    <a:ext uri="{FF2B5EF4-FFF2-40B4-BE49-F238E27FC236}">
+                      <a16:creationId xmlns:a16="http://schemas.microsoft.com/office/drawing/2014/main" id="{6C7C0DB7-F9FF-A7A5-1E23-983F1236C45F}"/>
+                    </a:ext>
+                  </a:extLst>
+                </p:cNvPr>
+                <p:cNvPicPr>
+                  <a:picLocks noChangeAspect="1"/>
+                </p:cNvPicPr>
+                <p:nvPr/>
+              </p:nvPicPr>
+              <p:blipFill>
+                <a:blip r:embed="rId2">
+                  <a:extLst>
+                    <a:ext uri="{28A0092B-C50C-407E-A947-70E740481C1C}">
+                      <a14:useLocalDpi xmlns:a14="http://schemas.microsoft.com/office/drawing/2010/main" val="0"/>
+                    </a:ext>
+                  </a:extLst>
+                </a:blip>
+                <a:stretch>
+                  <a:fillRect/>
+                </a:stretch>
+              </p:blipFill>
+              <p:spPr>
+                <a:xfrm>
+                  <a:off x="924935" y="1728359"/>
+                  <a:ext cx="488710" cy="488710"/>
+                </a:xfrm>
+                <a:prstGeom prst="rect">
+                  <a:avLst/>
+                </a:prstGeom>
+              </p:spPr>
+            </p:pic>
+            <p:pic>
+              <p:nvPicPr>
+                <p:cNvPr id="11" name="Inhaltsplatzhalter 6">
+                  <a:extLst>
+                    <a:ext uri="{FF2B5EF4-FFF2-40B4-BE49-F238E27FC236}">
+                      <a16:creationId xmlns:a16="http://schemas.microsoft.com/office/drawing/2014/main" id="{5474AE0B-D451-2C25-9EAC-033057DA7B29}"/>
+                    </a:ext>
+                  </a:extLst>
+                </p:cNvPr>
+                <p:cNvPicPr>
+                  <a:picLocks noChangeAspect="1"/>
+                </p:cNvPicPr>
+                <p:nvPr/>
+              </p:nvPicPr>
+              <p:blipFill>
+                <a:blip r:embed="rId2">
+                  <a:extLst>
+                    <a:ext uri="{28A0092B-C50C-407E-A947-70E740481C1C}">
+                      <a14:useLocalDpi xmlns:a14="http://schemas.microsoft.com/office/drawing/2010/main" val="0"/>
+                    </a:ext>
+                  </a:extLst>
+                </a:blip>
+                <a:stretch>
+                  <a:fillRect/>
+                </a:stretch>
+              </p:blipFill>
+              <p:spPr>
+                <a:xfrm>
+                  <a:off x="1413645" y="2208532"/>
+                  <a:ext cx="488710" cy="488710"/>
+                </a:xfrm>
+                <a:prstGeom prst="rect">
+                  <a:avLst/>
+                </a:prstGeom>
+              </p:spPr>
+            </p:pic>
+            <p:pic>
+              <p:nvPicPr>
+                <p:cNvPr id="12" name="Inhaltsplatzhalter 6">
+                  <a:extLst>
+                    <a:ext uri="{FF2B5EF4-FFF2-40B4-BE49-F238E27FC236}">
+                      <a16:creationId xmlns:a16="http://schemas.microsoft.com/office/drawing/2014/main" id="{9EF4B8E7-B8E6-5EE3-686C-EE16210CFF0E}"/>
+                    </a:ext>
+                  </a:extLst>
+                </p:cNvPr>
+                <p:cNvPicPr>
+                  <a:picLocks noChangeAspect="1"/>
+                </p:cNvPicPr>
+                <p:nvPr/>
+              </p:nvPicPr>
+              <p:blipFill>
+                <a:blip r:embed="rId2">
+                  <a:extLst>
+                    <a:ext uri="{28A0092B-C50C-407E-A947-70E740481C1C}">
+                      <a14:useLocalDpi xmlns:a14="http://schemas.microsoft.com/office/drawing/2010/main" val="0"/>
+                    </a:ext>
+                  </a:extLst>
+                </a:blip>
+                <a:stretch>
+                  <a:fillRect/>
+                </a:stretch>
+              </p:blipFill>
+              <p:spPr>
+                <a:xfrm>
+                  <a:off x="1413645" y="3832267"/>
+                  <a:ext cx="488710" cy="488710"/>
+                </a:xfrm>
+                <a:prstGeom prst="rect">
+                  <a:avLst/>
+                </a:prstGeom>
+              </p:spPr>
+            </p:pic>
+            <p:pic>
+              <p:nvPicPr>
+                <p:cNvPr id="13" name="Inhaltsplatzhalter 6">
+                  <a:extLst>
+                    <a:ext uri="{FF2B5EF4-FFF2-40B4-BE49-F238E27FC236}">
+                      <a16:creationId xmlns:a16="http://schemas.microsoft.com/office/drawing/2014/main" id="{570E6EFF-2036-47F0-D5B1-84507BCA2F94}"/>
+                    </a:ext>
+                  </a:extLst>
+                </p:cNvPr>
+                <p:cNvPicPr>
+                  <a:picLocks noChangeAspect="1"/>
+                </p:cNvPicPr>
+                <p:nvPr/>
+              </p:nvPicPr>
+              <p:blipFill>
+                <a:blip r:embed="rId2">
+                  <a:extLst>
+                    <a:ext uri="{28A0092B-C50C-407E-A947-70E740481C1C}">
+                      <a14:useLocalDpi xmlns:a14="http://schemas.microsoft.com/office/drawing/2010/main" val="0"/>
+                    </a:ext>
+                  </a:extLst>
+                </a:blip>
+                <a:stretch>
+                  <a:fillRect/>
+                </a:stretch>
+              </p:blipFill>
+              <p:spPr>
+                <a:xfrm>
+                  <a:off x="924935" y="4854125"/>
+                  <a:ext cx="488710" cy="488710"/>
+                </a:xfrm>
+                <a:prstGeom prst="rect">
+                  <a:avLst/>
+                </a:prstGeom>
+              </p:spPr>
+            </p:pic>
+            <p:pic>
+              <p:nvPicPr>
+                <p:cNvPr id="14" name="Inhaltsplatzhalter 6">
+                  <a:extLst>
+                    <a:ext uri="{FF2B5EF4-FFF2-40B4-BE49-F238E27FC236}">
+                      <a16:creationId xmlns:a16="http://schemas.microsoft.com/office/drawing/2014/main" id="{3CC96C91-A284-F3A4-23E4-08FE3B6869A7}"/>
+                    </a:ext>
+                  </a:extLst>
+                </p:cNvPr>
+                <p:cNvPicPr>
+                  <a:picLocks noChangeAspect="1"/>
+                </p:cNvPicPr>
+                <p:nvPr/>
+              </p:nvPicPr>
+              <p:blipFill>
+                <a:blip r:embed="rId2">
+                  <a:extLst>
+                    <a:ext uri="{28A0092B-C50C-407E-A947-70E740481C1C}">
+                      <a14:useLocalDpi xmlns:a14="http://schemas.microsoft.com/office/drawing/2010/main" val="0"/>
+                    </a:ext>
+                  </a:extLst>
+                </a:blip>
+                <a:stretch>
+                  <a:fillRect/>
+                </a:stretch>
+              </p:blipFill>
+              <p:spPr>
+                <a:xfrm>
+                  <a:off x="930390" y="5377069"/>
+                  <a:ext cx="488710" cy="488710"/>
+                </a:xfrm>
+                <a:prstGeom prst="rect">
+                  <a:avLst/>
+                </a:prstGeom>
+              </p:spPr>
+            </p:pic>
+            <p:pic>
+              <p:nvPicPr>
+                <p:cNvPr id="6" name="Grafik 5">
+                  <a:extLst>
+                    <a:ext uri="{FF2B5EF4-FFF2-40B4-BE49-F238E27FC236}">
+                      <a16:creationId xmlns:a16="http://schemas.microsoft.com/office/drawing/2014/main" id="{CDF97EA9-B3D6-0F5E-281C-52334497CD05}"/>
+                    </a:ext>
+                  </a:extLst>
+                </p:cNvPr>
+                <p:cNvPicPr>
+                  <a:picLocks noChangeAspect="1"/>
+                </p:cNvPicPr>
+                <p:nvPr/>
+              </p:nvPicPr>
+              <p:blipFill>
+                <a:blip r:embed="rId3">
+                  <a:extLst>
+                    <a:ext uri="{28A0092B-C50C-407E-A947-70E740481C1C}">
+                      <a14:useLocalDpi xmlns:a14="http://schemas.microsoft.com/office/drawing/2010/main" val="0"/>
+                    </a:ext>
+                  </a:extLst>
+                </a:blip>
+                <a:stretch>
+                  <a:fillRect/>
+                </a:stretch>
+              </p:blipFill>
+              <p:spPr>
+                <a:xfrm>
+                  <a:off x="1940437" y="2716851"/>
+                  <a:ext cx="488710" cy="488710"/>
+                </a:xfrm>
+                <a:prstGeom prst="rect">
+                  <a:avLst/>
+                </a:prstGeom>
+              </p:spPr>
+            </p:pic>
+            <p:pic>
+              <p:nvPicPr>
+                <p:cNvPr id="8" name="Grafik 7">
+                  <a:extLst>
+                    <a:ext uri="{FF2B5EF4-FFF2-40B4-BE49-F238E27FC236}">
+                      <a16:creationId xmlns:a16="http://schemas.microsoft.com/office/drawing/2014/main" id="{C9664CCC-EFDB-F094-B74A-D2A51B68B0E8}"/>
+                    </a:ext>
+                  </a:extLst>
+                </p:cNvPr>
+                <p:cNvPicPr>
+                  <a:picLocks noChangeAspect="1"/>
+                </p:cNvPicPr>
+                <p:nvPr/>
+              </p:nvPicPr>
+              <p:blipFill>
+                <a:blip r:embed="rId4">
+                  <a:extLst>
+                    <a:ext uri="{28A0092B-C50C-407E-A947-70E740481C1C}">
+                      <a14:useLocalDpi xmlns:a14="http://schemas.microsoft.com/office/drawing/2010/main" val="0"/>
+                    </a:ext>
+                  </a:extLst>
+                </a:blip>
+                <a:stretch>
+                  <a:fillRect/>
+                </a:stretch>
+              </p:blipFill>
+              <p:spPr>
+                <a:xfrm>
+                  <a:off x="1940437" y="3311413"/>
+                  <a:ext cx="530686" cy="530686"/>
+                </a:xfrm>
+                <a:prstGeom prst="rect">
+                  <a:avLst/>
+                </a:prstGeom>
+              </p:spPr>
+            </p:pic>
+            <p:pic>
+              <p:nvPicPr>
+                <p:cNvPr id="17" name="Grafik 16">
+                  <a:extLst>
+                    <a:ext uri="{FF2B5EF4-FFF2-40B4-BE49-F238E27FC236}">
+                      <a16:creationId xmlns:a16="http://schemas.microsoft.com/office/drawing/2014/main" id="{79ADB3A8-6476-0315-E929-6BB9398FB7E5}"/>
+                    </a:ext>
+                  </a:extLst>
+                </p:cNvPr>
+                <p:cNvPicPr>
+                  <a:picLocks noChangeAspect="1"/>
+                </p:cNvPicPr>
+                <p:nvPr/>
+              </p:nvPicPr>
+              <p:blipFill>
+                <a:blip r:embed="rId5">
+                  <a:extLst>
+                    <a:ext uri="{28A0092B-C50C-407E-A947-70E740481C1C}">
+                      <a14:useLocalDpi xmlns:a14="http://schemas.microsoft.com/office/drawing/2010/main" val="0"/>
+                    </a:ext>
+                  </a:extLst>
+                </a:blip>
+                <a:stretch>
+                  <a:fillRect/>
+                </a:stretch>
+              </p:blipFill>
+              <p:spPr>
+                <a:xfrm>
+                  <a:off x="1967072" y="4346435"/>
+                  <a:ext cx="488710" cy="488710"/>
+                </a:xfrm>
+                <a:prstGeom prst="rect">
+                  <a:avLst/>
+                </a:prstGeom>
+              </p:spPr>
+            </p:pic>
+            <p:pic>
+              <p:nvPicPr>
+                <p:cNvPr id="18" name="Inhaltsplatzhalter 6">
+                  <a:extLst>
+                    <a:ext uri="{FF2B5EF4-FFF2-40B4-BE49-F238E27FC236}">
+                      <a16:creationId xmlns:a16="http://schemas.microsoft.com/office/drawing/2014/main" id="{28088E99-9CE0-87A3-BFFC-6C3B88157ABF}"/>
+                    </a:ext>
+                  </a:extLst>
+                </p:cNvPr>
+                <p:cNvPicPr>
+                  <a:picLocks noChangeAspect="1"/>
+                </p:cNvPicPr>
+                <p:nvPr/>
+              </p:nvPicPr>
+              <p:blipFill>
+                <a:blip r:embed="rId2">
+                  <a:extLst>
+                    <a:ext uri="{28A0092B-C50C-407E-A947-70E740481C1C}">
+                      <a14:useLocalDpi xmlns:a14="http://schemas.microsoft.com/office/drawing/2010/main" val="0"/>
+                    </a:ext>
+                  </a:extLst>
+                </a:blip>
+                <a:stretch>
+                  <a:fillRect/>
+                </a:stretch>
+              </p:blipFill>
+              <p:spPr>
+                <a:xfrm>
+                  <a:off x="924935" y="5885959"/>
+                  <a:ext cx="488710" cy="488710"/>
+                </a:xfrm>
+                <a:prstGeom prst="rect">
+                  <a:avLst/>
+                </a:prstGeom>
+              </p:spPr>
+            </p:pic>
+          </p:grpSp>
+          <p:cxnSp>
+            <p:nvCxnSpPr>
+              <p:cNvPr id="22" name="Verbinder: gewinkelt 21">
+                <a:extLst>
+                  <a:ext uri="{FF2B5EF4-FFF2-40B4-BE49-F238E27FC236}">
+                    <a16:creationId xmlns:a16="http://schemas.microsoft.com/office/drawing/2014/main" id="{AF6CDC23-872D-6569-58AF-F4142C7B241B}"/>
+                  </a:ext>
+                </a:extLst>
+              </p:cNvPr>
+              <p:cNvCxnSpPr>
+                <a:cxnSpLocks/>
+                <a:stCxn id="10" idx="2"/>
+                <a:endCxn id="11" idx="1"/>
+              </p:cNvCxnSpPr>
+              <p:nvPr/>
+            </p:nvCxnSpPr>
+            <p:spPr>
+              <a:xfrm rot="16200000" flipH="1">
+                <a:off x="1968371" y="2291517"/>
+                <a:ext cx="235818" cy="244355"/>
+              </a:xfrm>
+              <a:prstGeom prst="bentConnector2">
+                <a:avLst/>
+              </a:prstGeom>
+              <a:ln w="22225">
+                <a:solidFill>
+                  <a:schemeClr val="tx1"/>
+                </a:solidFill>
+                <a:tailEnd type="triangle"/>
+              </a:ln>
+            </p:spPr>
+            <p:style>
+              <a:lnRef idx="3">
+                <a:schemeClr val="dk1"/>
+              </a:lnRef>
+              <a:fillRef idx="0">
+                <a:schemeClr val="dk1"/>
+              </a:fillRef>
+              <a:effectRef idx="2">
+                <a:schemeClr val="dk1"/>
+              </a:effectRef>
+              <a:fontRef idx="minor">
+                <a:schemeClr val="tx1"/>
+              </a:fontRef>
+            </p:style>
+          </p:cxnSp>
+          <p:cxnSp>
+            <p:nvCxnSpPr>
+              <p:cNvPr id="25" name="Verbinder: gewinkelt 24">
+                <a:extLst>
+                  <a:ext uri="{FF2B5EF4-FFF2-40B4-BE49-F238E27FC236}">
+                    <a16:creationId xmlns:a16="http://schemas.microsoft.com/office/drawing/2014/main" id="{A581FC8D-227A-AFC8-F1B2-581E5D269757}"/>
+                  </a:ext>
+                </a:extLst>
+              </p:cNvPr>
+              <p:cNvCxnSpPr>
+                <a:cxnSpLocks/>
+                <a:stCxn id="11" idx="2"/>
+                <a:endCxn id="6" idx="1"/>
+              </p:cNvCxnSpPr>
+              <p:nvPr/>
+            </p:nvCxnSpPr>
+            <p:spPr>
+              <a:xfrm rot="16200000" flipH="1">
+                <a:off x="2462049" y="2766722"/>
+                <a:ext cx="263964" cy="282437"/>
+              </a:xfrm>
+              <a:prstGeom prst="bentConnector2">
+                <a:avLst/>
+              </a:prstGeom>
+              <a:ln w="22225">
+                <a:solidFill>
+                  <a:schemeClr val="tx1"/>
+                </a:solidFill>
+                <a:tailEnd type="triangle"/>
+              </a:ln>
+            </p:spPr>
+            <p:style>
+              <a:lnRef idx="3">
+                <a:schemeClr val="dk1"/>
+              </a:lnRef>
+              <a:fillRef idx="0">
+                <a:schemeClr val="dk1"/>
+              </a:fillRef>
+              <a:effectRef idx="2">
+                <a:schemeClr val="dk1"/>
+              </a:effectRef>
+              <a:fontRef idx="minor">
+                <a:schemeClr val="tx1"/>
+              </a:fontRef>
+            </p:style>
+          </p:cxnSp>
+          <p:cxnSp>
+            <p:nvCxnSpPr>
+              <p:cNvPr id="28" name="Verbinder: gewinkelt 27">
+                <a:extLst>
+                  <a:ext uri="{FF2B5EF4-FFF2-40B4-BE49-F238E27FC236}">
+                    <a16:creationId xmlns:a16="http://schemas.microsoft.com/office/drawing/2014/main" id="{287717C3-65F3-2DB7-28D2-30EBC801020C}"/>
+                  </a:ext>
+                </a:extLst>
+              </p:cNvPr>
+              <p:cNvCxnSpPr>
+                <a:cxnSpLocks/>
+                <a:stCxn id="11" idx="2"/>
+                <a:endCxn id="8" idx="1"/>
+              </p:cNvCxnSpPr>
+              <p:nvPr/>
+            </p:nvCxnSpPr>
+            <p:spPr>
+              <a:xfrm rot="16200000" flipH="1">
+                <a:off x="2154274" y="3074497"/>
+                <a:ext cx="879514" cy="282437"/>
+              </a:xfrm>
+              <a:prstGeom prst="bentConnector2">
+                <a:avLst/>
+              </a:prstGeom>
+              <a:ln w="22225">
+                <a:solidFill>
+                  <a:schemeClr val="tx1"/>
+                </a:solidFill>
+                <a:tailEnd type="triangle"/>
+              </a:ln>
+            </p:spPr>
+            <p:style>
+              <a:lnRef idx="3">
+                <a:schemeClr val="dk1"/>
+              </a:lnRef>
+              <a:fillRef idx="0">
+                <a:schemeClr val="dk1"/>
+              </a:fillRef>
+              <a:effectRef idx="2">
+                <a:schemeClr val="dk1"/>
+              </a:effectRef>
+              <a:fontRef idx="minor">
+                <a:schemeClr val="tx1"/>
+              </a:fontRef>
+            </p:style>
+          </p:cxnSp>
+          <p:cxnSp>
+            <p:nvCxnSpPr>
+              <p:cNvPr id="31" name="Verbinder: gewinkelt 30">
+                <a:extLst>
+                  <a:ext uri="{FF2B5EF4-FFF2-40B4-BE49-F238E27FC236}">
+                    <a16:creationId xmlns:a16="http://schemas.microsoft.com/office/drawing/2014/main" id="{9A6D6928-92AB-3FDF-CBB4-7EB94B19EB2A}"/>
+                  </a:ext>
+                </a:extLst>
+              </p:cNvPr>
+              <p:cNvCxnSpPr>
+                <a:cxnSpLocks/>
+                <a:stCxn id="10" idx="2"/>
+                <a:endCxn id="12" idx="1"/>
+              </p:cNvCxnSpPr>
+              <p:nvPr/>
+            </p:nvCxnSpPr>
+            <p:spPr>
+              <a:xfrm rot="16200000" flipH="1">
+                <a:off x="1156504" y="3103384"/>
+                <a:ext cx="1859553" cy="244355"/>
+              </a:xfrm>
+              <a:prstGeom prst="bentConnector2">
+                <a:avLst/>
+              </a:prstGeom>
+              <a:ln w="22225">
+                <a:solidFill>
+                  <a:schemeClr val="tx1"/>
+                </a:solidFill>
+                <a:tailEnd type="triangle"/>
+              </a:ln>
+            </p:spPr>
+            <p:style>
+              <a:lnRef idx="3">
+                <a:schemeClr val="dk1"/>
+              </a:lnRef>
+              <a:fillRef idx="0">
+                <a:schemeClr val="dk1"/>
+              </a:fillRef>
+              <a:effectRef idx="2">
+                <a:schemeClr val="dk1"/>
+              </a:effectRef>
+              <a:fontRef idx="minor">
+                <a:schemeClr val="tx1"/>
+              </a:fontRef>
+            </p:style>
+          </p:cxnSp>
+          <p:cxnSp>
+            <p:nvCxnSpPr>
+              <p:cNvPr id="34" name="Verbinder: gewinkelt 33">
+                <a:extLst>
+                  <a:ext uri="{FF2B5EF4-FFF2-40B4-BE49-F238E27FC236}">
+                    <a16:creationId xmlns:a16="http://schemas.microsoft.com/office/drawing/2014/main" id="{6D21919D-FF1A-DC05-0E94-3123889EC3FB}"/>
+                  </a:ext>
+                </a:extLst>
+              </p:cNvPr>
+              <p:cNvCxnSpPr>
+                <a:cxnSpLocks/>
+                <a:stCxn id="12" idx="2"/>
+                <a:endCxn id="17" idx="1"/>
+              </p:cNvCxnSpPr>
+              <p:nvPr/>
+            </p:nvCxnSpPr>
+            <p:spPr>
+              <a:xfrm rot="16200000" flipH="1">
+                <a:off x="2472443" y="4380064"/>
+                <a:ext cx="269813" cy="309072"/>
+              </a:xfrm>
+              <a:prstGeom prst="bentConnector2">
+                <a:avLst/>
+              </a:prstGeom>
+              <a:ln w="22225">
+                <a:solidFill>
+                  <a:schemeClr val="tx1"/>
+                </a:solidFill>
+                <a:tailEnd type="triangle"/>
+              </a:ln>
+            </p:spPr>
+            <p:style>
+              <a:lnRef idx="3">
+                <a:schemeClr val="dk1"/>
+              </a:lnRef>
+              <a:fillRef idx="0">
+                <a:schemeClr val="dk1"/>
+              </a:fillRef>
+              <a:effectRef idx="2">
+                <a:schemeClr val="dk1"/>
+              </a:effectRef>
+              <a:fontRef idx="minor">
+                <a:schemeClr val="tx1"/>
+              </a:fontRef>
+            </p:style>
+          </p:cxnSp>
+          <p:sp>
+            <p:nvSpPr>
+              <p:cNvPr id="46" name="Textfeld 45">
+                <a:extLst>
+                  <a:ext uri="{FF2B5EF4-FFF2-40B4-BE49-F238E27FC236}">
+                    <a16:creationId xmlns:a16="http://schemas.microsoft.com/office/drawing/2014/main" id="{1C7A7D94-9BE0-9621-B64A-5AB037114C8C}"/>
+                  </a:ext>
+                </a:extLst>
+              </p:cNvPr>
+              <p:cNvSpPr txBox="1"/>
+              <p:nvPr/>
+            </p:nvSpPr>
+            <p:spPr>
+              <a:xfrm>
+                <a:off x="990709" y="1272815"/>
+                <a:ext cx="973393" cy="584775"/>
+              </a:xfrm>
+              <a:prstGeom prst="rect">
+                <a:avLst/>
+              </a:prstGeom>
+              <a:noFill/>
+            </p:spPr>
+            <p:txBody>
+              <a:bodyPr wrap="square" rtlCol="0">
+                <a:spAutoFit/>
+              </a:bodyPr>
+              <a:lstStyle/>
+              <a:p>
+                <a:r>
+                  <a:rPr lang="de-DE" sz="3200" b="1" dirty="0">
+                    <a:latin typeface="Barrio" panose="00000500000000000000" pitchFamily="2" charset="0"/>
+                  </a:rPr>
+                  <a:t>  …</a:t>
+                </a:r>
+              </a:p>
+            </p:txBody>
+          </p:sp>
+          <p:cxnSp>
+            <p:nvCxnSpPr>
+              <p:cNvPr id="47" name="Verbinder: gewinkelt 46">
+                <a:extLst>
+                  <a:ext uri="{FF2B5EF4-FFF2-40B4-BE49-F238E27FC236}">
+                    <a16:creationId xmlns:a16="http://schemas.microsoft.com/office/drawing/2014/main" id="{BF99C512-30D9-38D8-1360-76F5B3607C73}"/>
+                  </a:ext>
+                </a:extLst>
+              </p:cNvPr>
+              <p:cNvCxnSpPr>
+                <a:cxnSpLocks/>
+                <a:stCxn id="46" idx="2"/>
+                <a:endCxn id="10" idx="1"/>
+              </p:cNvCxnSpPr>
+              <p:nvPr/>
+            </p:nvCxnSpPr>
+            <p:spPr>
+              <a:xfrm rot="16200000" flipH="1">
+                <a:off x="1501657" y="1833339"/>
+                <a:ext cx="193841" cy="242342"/>
+              </a:xfrm>
+              <a:prstGeom prst="bentConnector2">
+                <a:avLst/>
+              </a:prstGeom>
+              <a:ln w="22225">
+                <a:solidFill>
+                  <a:schemeClr val="tx1"/>
+                </a:solidFill>
+                <a:tailEnd type="triangle"/>
+              </a:ln>
+            </p:spPr>
+            <p:style>
+              <a:lnRef idx="3">
+                <a:schemeClr val="dk1"/>
+              </a:lnRef>
+              <a:fillRef idx="0">
+                <a:schemeClr val="dk1"/>
+              </a:fillRef>
+              <a:effectRef idx="2">
+                <a:schemeClr val="dk1"/>
+              </a:effectRef>
+              <a:fontRef idx="minor">
+                <a:schemeClr val="tx1"/>
+              </a:fontRef>
+            </p:style>
+          </p:cxnSp>
+          <p:cxnSp>
+            <p:nvCxnSpPr>
+              <p:cNvPr id="52" name="Verbinder: gewinkelt 51">
+                <a:extLst>
+                  <a:ext uri="{FF2B5EF4-FFF2-40B4-BE49-F238E27FC236}">
+                    <a16:creationId xmlns:a16="http://schemas.microsoft.com/office/drawing/2014/main" id="{E45ED6AF-822B-A338-7F81-730593D17A86}"/>
+                  </a:ext>
+                </a:extLst>
+              </p:cNvPr>
+              <p:cNvCxnSpPr>
+                <a:cxnSpLocks/>
+                <a:stCxn id="46" idx="2"/>
+                <a:endCxn id="13" idx="1"/>
+              </p:cNvCxnSpPr>
+              <p:nvPr/>
+            </p:nvCxnSpPr>
+            <p:spPr>
+              <a:xfrm rot="16200000" flipH="1">
+                <a:off x="-61226" y="3396222"/>
+                <a:ext cx="3319607" cy="242342"/>
+              </a:xfrm>
+              <a:prstGeom prst="bentConnector2">
+                <a:avLst/>
+              </a:prstGeom>
+              <a:ln w="22225">
+                <a:solidFill>
+                  <a:schemeClr val="tx1"/>
+                </a:solidFill>
+                <a:tailEnd type="triangle"/>
+              </a:ln>
+            </p:spPr>
+            <p:style>
+              <a:lnRef idx="3">
+                <a:schemeClr val="dk1"/>
+              </a:lnRef>
+              <a:fillRef idx="0">
+                <a:schemeClr val="dk1"/>
+              </a:fillRef>
+              <a:effectRef idx="2">
+                <a:schemeClr val="dk1"/>
+              </a:effectRef>
+              <a:fontRef idx="minor">
+                <a:schemeClr val="tx1"/>
+              </a:fontRef>
+            </p:style>
+          </p:cxnSp>
+          <p:cxnSp>
+            <p:nvCxnSpPr>
+              <p:cNvPr id="55" name="Verbinder: gewinkelt 54">
+                <a:extLst>
+                  <a:ext uri="{FF2B5EF4-FFF2-40B4-BE49-F238E27FC236}">
+                    <a16:creationId xmlns:a16="http://schemas.microsoft.com/office/drawing/2014/main" id="{B47C360B-6B5E-9736-0598-82AB898E7355}"/>
+                  </a:ext>
+                </a:extLst>
+              </p:cNvPr>
+              <p:cNvCxnSpPr>
+                <a:cxnSpLocks/>
+                <a:stCxn id="46" idx="2"/>
+                <a:endCxn id="14" idx="1"/>
+              </p:cNvCxnSpPr>
+              <p:nvPr/>
+            </p:nvCxnSpPr>
+            <p:spPr>
+              <a:xfrm rot="16200000" flipH="1">
+                <a:off x="-319971" y="3654966"/>
+                <a:ext cx="3842551" cy="247797"/>
+              </a:xfrm>
+              <a:prstGeom prst="bentConnector2">
+                <a:avLst/>
+              </a:prstGeom>
+              <a:ln w="22225">
+                <a:solidFill>
+                  <a:schemeClr val="tx1"/>
+                </a:solidFill>
+                <a:tailEnd type="triangle"/>
+              </a:ln>
+            </p:spPr>
+            <p:style>
+              <a:lnRef idx="3">
+                <a:schemeClr val="dk1"/>
+              </a:lnRef>
+              <a:fillRef idx="0">
+                <a:schemeClr val="dk1"/>
+              </a:fillRef>
+              <a:effectRef idx="2">
+                <a:schemeClr val="dk1"/>
+              </a:effectRef>
+              <a:fontRef idx="minor">
+                <a:schemeClr val="tx1"/>
+              </a:fontRef>
+            </p:style>
+          </p:cxnSp>
+          <p:cxnSp>
+            <p:nvCxnSpPr>
+              <p:cNvPr id="58" name="Verbinder: gewinkelt 57">
+                <a:extLst>
+                  <a:ext uri="{FF2B5EF4-FFF2-40B4-BE49-F238E27FC236}">
+                    <a16:creationId xmlns:a16="http://schemas.microsoft.com/office/drawing/2014/main" id="{D6F38C68-2BB2-8A99-5539-A514980C7A87}"/>
+                  </a:ext>
+                </a:extLst>
+              </p:cNvPr>
+              <p:cNvCxnSpPr>
+                <a:cxnSpLocks/>
+                <a:stCxn id="46" idx="2"/>
+                <a:endCxn id="18" idx="1"/>
+              </p:cNvCxnSpPr>
+              <p:nvPr/>
+            </p:nvCxnSpPr>
+            <p:spPr>
+              <a:xfrm rot="16200000" flipH="1">
+                <a:off x="-577143" y="3912139"/>
+                <a:ext cx="4351441" cy="242342"/>
+              </a:xfrm>
+              <a:prstGeom prst="bentConnector2">
+                <a:avLst/>
+              </a:prstGeom>
+              <a:ln w="22225">
+                <a:solidFill>
+                  <a:schemeClr val="tx1"/>
+                </a:solidFill>
+                <a:tailEnd type="triangle"/>
+              </a:ln>
+            </p:spPr>
+            <p:style>
+              <a:lnRef idx="3">
+                <a:schemeClr val="dk1"/>
+              </a:lnRef>
+              <a:fillRef idx="0">
+                <a:schemeClr val="dk1"/>
+              </a:fillRef>
+              <a:effectRef idx="2">
+                <a:schemeClr val="dk1"/>
+              </a:effectRef>
+              <a:fontRef idx="minor">
+                <a:schemeClr val="tx1"/>
+              </a:fontRef>
+            </p:style>
+          </p:cxnSp>
+        </p:grpSp>
+        <p:sp>
+          <p:nvSpPr>
+            <p:cNvPr id="66" name="Textfeld 65">
+              <a:extLst>
+                <a:ext uri="{FF2B5EF4-FFF2-40B4-BE49-F238E27FC236}">
+                  <a16:creationId xmlns:a16="http://schemas.microsoft.com/office/drawing/2014/main" id="{0DC2A22F-4378-1760-1CA6-D15E865C0AC6}"/>
+                </a:ext>
+              </a:extLst>
+            </p:cNvPr>
+            <p:cNvSpPr txBox="1"/>
+            <p:nvPr/>
+          </p:nvSpPr>
+          <p:spPr>
+            <a:xfrm>
+              <a:off x="2213913" y="1820318"/>
+              <a:ext cx="2644878" cy="461665"/>
+            </a:xfrm>
+            <a:prstGeom prst="rect">
+              <a:avLst/>
+            </a:prstGeom>
+            <a:noFill/>
+          </p:spPr>
+          <p:txBody>
+            <a:bodyPr wrap="square" rtlCol="0">
+              <a:spAutoFit/>
+            </a:bodyPr>
+            <a:lstStyle/>
+            <a:p>
+              <a:r>
+                <a:rPr lang="de-DE" sz="2400" dirty="0" err="1"/>
+                <a:t>overview</a:t>
+              </a:r>
+              <a:endParaRPr lang="de-DE" dirty="0"/>
+            </a:p>
+          </p:txBody>
+        </p:sp>
+        <p:sp>
+          <p:nvSpPr>
+            <p:cNvPr id="67" name="Textfeld 66">
+              <a:extLst>
+                <a:ext uri="{FF2B5EF4-FFF2-40B4-BE49-F238E27FC236}">
+                  <a16:creationId xmlns:a16="http://schemas.microsoft.com/office/drawing/2014/main" id="{B700D6C8-9A3C-8324-97F2-6B5326A83437}"/>
+                </a:ext>
+              </a:extLst>
+            </p:cNvPr>
+            <p:cNvSpPr txBox="1"/>
+            <p:nvPr/>
+          </p:nvSpPr>
+          <p:spPr>
+            <a:xfrm>
+              <a:off x="2735250" y="2277552"/>
+              <a:ext cx="2644878" cy="461665"/>
+            </a:xfrm>
+            <a:prstGeom prst="rect">
+              <a:avLst/>
+            </a:prstGeom>
+            <a:noFill/>
+          </p:spPr>
+          <p:txBody>
+            <a:bodyPr wrap="square" rtlCol="0">
+              <a:spAutoFit/>
+            </a:bodyPr>
+            <a:lstStyle/>
+            <a:p>
+              <a:r>
+                <a:rPr lang="de-DE" sz="2400" dirty="0" err="1"/>
+                <a:t>static</a:t>
+              </a:r>
+              <a:endParaRPr lang="de-DE" dirty="0"/>
+            </a:p>
+          </p:txBody>
+        </p:sp>
+        <p:sp>
+          <p:nvSpPr>
+            <p:cNvPr id="68" name="Textfeld 67">
+              <a:extLst>
+                <a:ext uri="{FF2B5EF4-FFF2-40B4-BE49-F238E27FC236}">
+                  <a16:creationId xmlns:a16="http://schemas.microsoft.com/office/drawing/2014/main" id="{EF174FAF-2B4A-3220-98DE-5390B9399DEB}"/>
+                </a:ext>
+              </a:extLst>
+            </p:cNvPr>
+            <p:cNvSpPr txBox="1"/>
+            <p:nvPr/>
+          </p:nvSpPr>
+          <p:spPr>
+            <a:xfrm>
+              <a:off x="3250595" y="2790873"/>
+              <a:ext cx="2644878" cy="461665"/>
+            </a:xfrm>
+            <a:prstGeom prst="rect">
+              <a:avLst/>
+            </a:prstGeom>
+            <a:noFill/>
+          </p:spPr>
+          <p:txBody>
+            <a:bodyPr wrap="square" rtlCol="0">
+              <a:spAutoFit/>
+            </a:bodyPr>
+            <a:lstStyle/>
+            <a:p>
+              <a:r>
+                <a:rPr lang="de-DE" sz="2400" dirty="0"/>
+                <a:t>image.png</a:t>
+              </a:r>
+              <a:endParaRPr lang="de-DE" dirty="0"/>
+            </a:p>
+          </p:txBody>
+        </p:sp>
+        <p:sp>
+          <p:nvSpPr>
+            <p:cNvPr id="69" name="Textfeld 68">
+              <a:extLst>
+                <a:ext uri="{FF2B5EF4-FFF2-40B4-BE49-F238E27FC236}">
+                  <a16:creationId xmlns:a16="http://schemas.microsoft.com/office/drawing/2014/main" id="{20360B32-168E-71F6-627D-5C4033EC8D20}"/>
+                </a:ext>
+              </a:extLst>
+            </p:cNvPr>
+            <p:cNvSpPr txBox="1"/>
+            <p:nvPr/>
+          </p:nvSpPr>
+          <p:spPr>
+            <a:xfrm>
+              <a:off x="3262041" y="3409502"/>
+              <a:ext cx="2644878" cy="461665"/>
+            </a:xfrm>
+            <a:prstGeom prst="rect">
+              <a:avLst/>
+            </a:prstGeom>
+            <a:noFill/>
+          </p:spPr>
+          <p:txBody>
+            <a:bodyPr wrap="square" rtlCol="0">
+              <a:spAutoFit/>
+            </a:bodyPr>
+            <a:lstStyle/>
+            <a:p>
+              <a:r>
+                <a:rPr lang="de-DE" sz="2400" dirty="0"/>
+                <a:t>styles.css</a:t>
+              </a:r>
+              <a:endParaRPr lang="de-DE" dirty="0"/>
+            </a:p>
+          </p:txBody>
+        </p:sp>
+        <p:sp>
+          <p:nvSpPr>
+            <p:cNvPr id="70" name="Textfeld 69">
+              <a:extLst>
+                <a:ext uri="{FF2B5EF4-FFF2-40B4-BE49-F238E27FC236}">
+                  <a16:creationId xmlns:a16="http://schemas.microsoft.com/office/drawing/2014/main" id="{3E254F6B-6B9F-1A67-A675-6301F5E20C4F}"/>
+                </a:ext>
+              </a:extLst>
+            </p:cNvPr>
+            <p:cNvSpPr txBox="1"/>
+            <p:nvPr/>
+          </p:nvSpPr>
+          <p:spPr>
+            <a:xfrm>
+              <a:off x="2735250" y="3929422"/>
+              <a:ext cx="2644878" cy="461665"/>
+            </a:xfrm>
+            <a:prstGeom prst="rect">
+              <a:avLst/>
+            </a:prstGeom>
+            <a:noFill/>
+          </p:spPr>
+          <p:txBody>
+            <a:bodyPr wrap="square" rtlCol="0">
+              <a:spAutoFit/>
+            </a:bodyPr>
+            <a:lstStyle/>
+            <a:p>
+              <a:r>
+                <a:rPr lang="de-DE" sz="2400" dirty="0" err="1"/>
+                <a:t>templates</a:t>
+              </a:r>
+              <a:endParaRPr lang="de-DE" dirty="0"/>
+            </a:p>
+          </p:txBody>
+        </p:sp>
+        <p:sp>
+          <p:nvSpPr>
+            <p:cNvPr id="71" name="Textfeld 70">
+              <a:extLst>
+                <a:ext uri="{FF2B5EF4-FFF2-40B4-BE49-F238E27FC236}">
+                  <a16:creationId xmlns:a16="http://schemas.microsoft.com/office/drawing/2014/main" id="{EAD181AB-18AD-CED2-EB37-72466D5E86CE}"/>
+                </a:ext>
+              </a:extLst>
+            </p:cNvPr>
+            <p:cNvSpPr txBox="1"/>
+            <p:nvPr/>
+          </p:nvSpPr>
+          <p:spPr>
+            <a:xfrm>
+              <a:off x="3262041" y="4438674"/>
+              <a:ext cx="2644878" cy="461665"/>
+            </a:xfrm>
+            <a:prstGeom prst="rect">
+              <a:avLst/>
+            </a:prstGeom>
+            <a:noFill/>
+          </p:spPr>
+          <p:txBody>
+            <a:bodyPr wrap="square" rtlCol="0">
+              <a:spAutoFit/>
+            </a:bodyPr>
+            <a:lstStyle/>
+            <a:p>
+              <a:r>
+                <a:rPr lang="de-DE" sz="2400" dirty="0"/>
+                <a:t>overview.html</a:t>
+              </a:r>
+              <a:endParaRPr lang="de-DE" dirty="0"/>
+            </a:p>
+          </p:txBody>
+        </p:sp>
+        <p:sp>
+          <p:nvSpPr>
+            <p:cNvPr id="72" name="Textfeld 71">
+              <a:extLst>
+                <a:ext uri="{FF2B5EF4-FFF2-40B4-BE49-F238E27FC236}">
+                  <a16:creationId xmlns:a16="http://schemas.microsoft.com/office/drawing/2014/main" id="{708D17E7-2383-8F19-A85A-D245F185057E}"/>
+                </a:ext>
+              </a:extLst>
+            </p:cNvPr>
+            <p:cNvSpPr txBox="1"/>
+            <p:nvPr/>
+          </p:nvSpPr>
+          <p:spPr>
+            <a:xfrm>
+              <a:off x="2208458" y="4952650"/>
+              <a:ext cx="2644878" cy="461665"/>
+            </a:xfrm>
+            <a:prstGeom prst="rect">
+              <a:avLst/>
+            </a:prstGeom>
+            <a:noFill/>
+          </p:spPr>
+          <p:txBody>
+            <a:bodyPr wrap="square" rtlCol="0">
+              <a:spAutoFit/>
+            </a:bodyPr>
+            <a:lstStyle/>
+            <a:p>
+              <a:r>
+                <a:rPr lang="de-DE" sz="2400" dirty="0" err="1"/>
+                <a:t>login</a:t>
+              </a:r>
+              <a:endParaRPr lang="de-DE" dirty="0"/>
+            </a:p>
+          </p:txBody>
+        </p:sp>
+        <p:sp>
+          <p:nvSpPr>
+            <p:cNvPr id="73" name="Textfeld 72">
+              <a:extLst>
+                <a:ext uri="{FF2B5EF4-FFF2-40B4-BE49-F238E27FC236}">
+                  <a16:creationId xmlns:a16="http://schemas.microsoft.com/office/drawing/2014/main" id="{4D636C33-85FB-B927-8274-09A25E8EC80F}"/>
+                </a:ext>
+              </a:extLst>
+            </p:cNvPr>
+            <p:cNvSpPr txBox="1"/>
+            <p:nvPr/>
+          </p:nvSpPr>
+          <p:spPr>
+            <a:xfrm>
+              <a:off x="2219367" y="5470508"/>
+              <a:ext cx="2644878" cy="461665"/>
+            </a:xfrm>
+            <a:prstGeom prst="rect">
+              <a:avLst/>
+            </a:prstGeom>
+            <a:noFill/>
+          </p:spPr>
+          <p:txBody>
+            <a:bodyPr wrap="square" rtlCol="0">
+              <a:spAutoFit/>
+            </a:bodyPr>
+            <a:lstStyle/>
+            <a:p>
+              <a:r>
+                <a:rPr lang="de-DE" sz="2400" dirty="0" err="1"/>
+                <a:t>reset_pw</a:t>
+              </a:r>
+              <a:endParaRPr lang="de-DE" dirty="0"/>
+            </a:p>
+          </p:txBody>
+        </p:sp>
+        <p:sp>
+          <p:nvSpPr>
+            <p:cNvPr id="74" name="Textfeld 73">
+              <a:extLst>
+                <a:ext uri="{FF2B5EF4-FFF2-40B4-BE49-F238E27FC236}">
+                  <a16:creationId xmlns:a16="http://schemas.microsoft.com/office/drawing/2014/main" id="{0BCB1299-EC4B-2A7C-7143-F4BBE06F4503}"/>
+                </a:ext>
+              </a:extLst>
+            </p:cNvPr>
+            <p:cNvSpPr txBox="1"/>
+            <p:nvPr/>
+          </p:nvSpPr>
+          <p:spPr>
+            <a:xfrm>
+              <a:off x="2221755" y="5975568"/>
+              <a:ext cx="2644878" cy="461665"/>
+            </a:xfrm>
+            <a:prstGeom prst="rect">
+              <a:avLst/>
+            </a:prstGeom>
+            <a:noFill/>
+          </p:spPr>
+          <p:txBody>
+            <a:bodyPr wrap="square" rtlCol="0">
+              <a:spAutoFit/>
+            </a:bodyPr>
+            <a:lstStyle/>
+            <a:p>
+              <a:r>
+                <a:rPr lang="de-DE" sz="2400" dirty="0" err="1"/>
+                <a:t>new_pw</a:t>
+              </a:r>
+              <a:endParaRPr lang="de-DE" dirty="0"/>
+            </a:p>
+          </p:txBody>
+        </p:sp>
+      </p:grpSp>
     </p:spTree>
     <p:extLst>
       <p:ext uri="{BB962C8B-B14F-4D97-AF65-F5344CB8AC3E}">

</xml_diff>